<commit_message>
Update 20190907 - Deep Learning 调研.pptx
</commit_message>
<xml_diff>
--- a/20190907 - Deep Learning 调研.pptx
+++ b/20190907 - Deep Learning 调研.pptx
@@ -7,8 +7,9 @@
   <p:sldIdLst>
     <p:sldId id="256" r:id="rId2"/>
     <p:sldId id="257" r:id="rId3"/>
-    <p:sldId id="258" r:id="rId4"/>
-    <p:sldId id="259" r:id="rId5"/>
+    <p:sldId id="259" r:id="rId4"/>
+    <p:sldId id="262" r:id="rId5"/>
+    <p:sldId id="264" r:id="rId6"/>
   </p:sldIdLst>
   <p:sldSz cx="12192000" cy="6858000"/>
   <p:notesSz cx="6858000" cy="9144000"/>
@@ -256,7 +257,7 @@
 </file>
 
 <file path=ppt/slideLayouts/slideLayout2.xml><?xml version="1.0" encoding="utf-8"?>
-<p:sldLayout xmlns:a="http://schemas.openxmlformats.org/drawingml/2006/main" xmlns:r="http://schemas.openxmlformats.org/officeDocument/2006/relationships" xmlns:p="http://schemas.openxmlformats.org/presentationml/2006/main" type="obj" preserve="1">
+<p:sldLayout xmlns:a="http://schemas.openxmlformats.org/drawingml/2006/main" xmlns:r="http://schemas.openxmlformats.org/officeDocument/2006/relationships" xmlns:p="http://schemas.openxmlformats.org/presentationml/2006/main" preserve="1" userDrawn="1">
   <p:cSld name="标题和内容">
     <p:spTree>
       <p:nvGrpSpPr>
@@ -274,10 +275,67 @@
       </p:grpSpPr>
       <p:sp>
         <p:nvSpPr>
-          <p:cNvPr id="2" name="标题 1">
-            <a:extLst>
-              <a:ext uri="{FF2B5EF4-FFF2-40B4-BE49-F238E27FC236}">
-                <a16:creationId xmlns:a16="http://schemas.microsoft.com/office/drawing/2014/main" id="{6569A621-CA28-461E-8292-88FB9D37C2A2}"/>
+          <p:cNvPr id="3" name="内容占位符 2">
+            <a:extLst>
+              <a:ext uri="{FF2B5EF4-FFF2-40B4-BE49-F238E27FC236}">
+                <a16:creationId xmlns:a16="http://schemas.microsoft.com/office/drawing/2014/main" id="{E9F26946-007E-4D0B-9211-32F0543C84A2}"/>
+              </a:ext>
+            </a:extLst>
+          </p:cNvPr>
+          <p:cNvSpPr>
+            <a:spLocks noGrp="1"/>
+          </p:cNvSpPr>
+          <p:nvPr>
+            <p:ph idx="1"/>
+          </p:nvPr>
+        </p:nvSpPr>
+        <p:spPr/>
+        <p:txBody>
+          <a:bodyPr/>
+          <a:lstStyle/>
+          <a:p>
+            <a:pPr lvl="0"/>
+            <a:r>
+              <a:rPr lang="zh-CN" altLang="en-US" dirty="0"/>
+              <a:t>单击此处编辑母版文本样式</a:t>
+            </a:r>
+          </a:p>
+          <a:p>
+            <a:pPr lvl="1"/>
+            <a:r>
+              <a:rPr lang="zh-CN" altLang="en-US" dirty="0"/>
+              <a:t>二级</a:t>
+            </a:r>
+          </a:p>
+          <a:p>
+            <a:pPr lvl="2"/>
+            <a:r>
+              <a:rPr lang="zh-CN" altLang="en-US" dirty="0"/>
+              <a:t>三级</a:t>
+            </a:r>
+          </a:p>
+          <a:p>
+            <a:pPr lvl="3"/>
+            <a:r>
+              <a:rPr lang="zh-CN" altLang="en-US" dirty="0"/>
+              <a:t>四级</a:t>
+            </a:r>
+          </a:p>
+          <a:p>
+            <a:pPr lvl="4"/>
+            <a:r>
+              <a:rPr lang="zh-CN" altLang="en-US" dirty="0"/>
+              <a:t>五级</a:t>
+            </a:r>
+          </a:p>
+        </p:txBody>
+      </p:sp>
+      <p:sp>
+        <p:nvSpPr>
+          <p:cNvPr id="8" name="标题 7">
+            <a:extLst>
+              <a:ext uri="{FF2B5EF4-FFF2-40B4-BE49-F238E27FC236}">
+                <a16:creationId xmlns:a16="http://schemas.microsoft.com/office/drawing/2014/main" id="{EAAB5729-E65D-47C7-82AA-5BAF32670724}"/>
               </a:ext>
             </a:extLst>
           </p:cNvPr>
@@ -294,12 +352,42 @@
           <a:lstStyle/>
           <a:p>
             <a:r>
-              <a:rPr lang="zh-CN" altLang="en-US" dirty="0"/>
+              <a:rPr lang="zh-CN" altLang="en-US"/>
               <a:t>单击此处编辑母版标题样式</a:t>
             </a:r>
           </a:p>
         </p:txBody>
       </p:sp>
+    </p:spTree>
+    <p:extLst>
+      <p:ext uri="{BB962C8B-B14F-4D97-AF65-F5344CB8AC3E}">
+        <p14:creationId xmlns:p14="http://schemas.microsoft.com/office/powerpoint/2010/main" val="2588768634"/>
+      </p:ext>
+    </p:extLst>
+  </p:cSld>
+  <p:clrMapOvr>
+    <a:masterClrMapping/>
+  </p:clrMapOvr>
+</p:sldLayout>
+</file>
+
+<file path=ppt/slideLayouts/slideLayout3.xml><?xml version="1.0" encoding="utf-8"?>
+<p:sldLayout xmlns:a="http://schemas.openxmlformats.org/drawingml/2006/main" xmlns:r="http://schemas.openxmlformats.org/officeDocument/2006/relationships" xmlns:p="http://schemas.openxmlformats.org/presentationml/2006/main" preserve="1" userDrawn="1">
+  <p:cSld name="1_标题和内容">
+    <p:spTree>
+      <p:nvGrpSpPr>
+        <p:cNvPr id="1" name=""/>
+        <p:cNvGrpSpPr/>
+        <p:nvPr/>
+      </p:nvGrpSpPr>
+      <p:grpSpPr>
+        <a:xfrm>
+          <a:off x="0" y="0"/>
+          <a:ext cx="0" cy="0"/>
+          <a:chOff x="0" y="0"/>
+          <a:chExt cx="0" cy="0"/>
+        </a:xfrm>
+      </p:grpSpPr>
       <p:sp>
         <p:nvSpPr>
           <p:cNvPr id="3" name="内容占位符 2">
@@ -316,7 +404,12 @@
             <p:ph idx="1"/>
           </p:nvPr>
         </p:nvSpPr>
-        <p:spPr/>
+        <p:spPr>
+          <a:xfrm>
+            <a:off x="6096000" y="1510748"/>
+            <a:ext cx="5257800" cy="5144494"/>
+          </a:xfrm>
+        </p:spPr>
         <p:txBody>
           <a:bodyPr/>
           <a:lstStyle/>
@@ -359,10 +452,10 @@
       </p:sp>
       <p:sp>
         <p:nvSpPr>
-          <p:cNvPr id="4" name="日期占位符 3">
-            <a:extLst>
-              <a:ext uri="{FF2B5EF4-FFF2-40B4-BE49-F238E27FC236}">
-                <a16:creationId xmlns:a16="http://schemas.microsoft.com/office/drawing/2014/main" id="{CF7D238B-FE8D-43EA-808B-0E7C39BD6A00}"/>
+          <p:cNvPr id="7" name="标题 6">
+            <a:extLst>
+              <a:ext uri="{FF2B5EF4-FFF2-40B4-BE49-F238E27FC236}">
+                <a16:creationId xmlns:a16="http://schemas.microsoft.com/office/drawing/2014/main" id="{11CCD648-C67F-480C-A8A7-4E480630A296}"/>
               </a:ext>
             </a:extLst>
           </p:cNvPr>
@@ -370,36 +463,57 @@
             <a:spLocks noGrp="1"/>
           </p:cNvSpPr>
           <p:nvPr>
-            <p:ph type="dt" sz="half" idx="10"/>
+            <p:ph type="title"/>
           </p:nvPr>
         </p:nvSpPr>
-        <p:spPr>
-          <a:xfrm>
-            <a:off x="838200" y="6356350"/>
-            <a:ext cx="2743200" cy="365125"/>
-          </a:xfrm>
-          <a:prstGeom prst="rect">
-            <a:avLst/>
-          </a:prstGeom>
-        </p:spPr>
+        <p:spPr/>
         <p:txBody>
           <a:bodyPr/>
           <a:lstStyle/>
           <a:p>
-            <a:fld id="{C3DF671B-B122-461A-8683-EDE178876DE0}" type="datetimeFigureOut">
-              <a:rPr lang="zh-CN" altLang="en-US" smtClean="0"/>
-              <a:t>2019/9/5</a:t>
-            </a:fld>
-            <a:endParaRPr lang="zh-CN" altLang="en-US"/>
-          </a:p>
-        </p:txBody>
-      </p:sp>
-      <p:sp>
-        <p:nvSpPr>
-          <p:cNvPr id="5" name="页脚占位符 4">
-            <a:extLst>
-              <a:ext uri="{FF2B5EF4-FFF2-40B4-BE49-F238E27FC236}">
-                <a16:creationId xmlns:a16="http://schemas.microsoft.com/office/drawing/2014/main" id="{3B9BBE8D-B747-4104-8DF6-B0473FDD69FA}"/>
+            <a:r>
+              <a:rPr lang="zh-CN" altLang="en-US"/>
+              <a:t>单击此处编辑母版标题样式</a:t>
+            </a:r>
+          </a:p>
+        </p:txBody>
+      </p:sp>
+    </p:spTree>
+    <p:extLst>
+      <p:ext uri="{BB962C8B-B14F-4D97-AF65-F5344CB8AC3E}">
+        <p14:creationId xmlns:p14="http://schemas.microsoft.com/office/powerpoint/2010/main" val="1471798273"/>
+      </p:ext>
+    </p:extLst>
+  </p:cSld>
+  <p:clrMapOvr>
+    <a:masterClrMapping/>
+  </p:clrMapOvr>
+</p:sldLayout>
+</file>
+
+<file path=ppt/slideLayouts/slideLayout4.xml><?xml version="1.0" encoding="utf-8"?>
+<p:sldLayout xmlns:a="http://schemas.openxmlformats.org/drawingml/2006/main" xmlns:r="http://schemas.openxmlformats.org/officeDocument/2006/relationships" xmlns:p="http://schemas.openxmlformats.org/presentationml/2006/main" preserve="1" userDrawn="1">
+  <p:cSld name="2_标题和内容">
+    <p:spTree>
+      <p:nvGrpSpPr>
+        <p:cNvPr id="1" name=""/>
+        <p:cNvGrpSpPr/>
+        <p:nvPr/>
+      </p:nvGrpSpPr>
+      <p:grpSpPr>
+        <a:xfrm>
+          <a:off x="0" y="0"/>
+          <a:ext cx="0" cy="0"/>
+          <a:chOff x="0" y="0"/>
+          <a:chExt cx="0" cy="0"/>
+        </a:xfrm>
+      </p:grpSpPr>
+      <p:sp>
+        <p:nvSpPr>
+          <p:cNvPr id="3" name="内容占位符 2">
+            <a:extLst>
+              <a:ext uri="{FF2B5EF4-FFF2-40B4-BE49-F238E27FC236}">
+                <a16:creationId xmlns:a16="http://schemas.microsoft.com/office/drawing/2014/main" id="{E9F26946-007E-4D0B-9211-32F0543C84A2}"/>
               </a:ext>
             </a:extLst>
           </p:cNvPr>
@@ -407,67 +521,59 @@
             <a:spLocks noGrp="1"/>
           </p:cNvSpPr>
           <p:nvPr>
-            <p:ph type="ftr" sz="quarter" idx="11"/>
+            <p:ph idx="1"/>
           </p:nvPr>
         </p:nvSpPr>
         <p:spPr>
           <a:xfrm>
-            <a:off x="4038600" y="6356350"/>
-            <a:ext cx="4114800" cy="365125"/>
+            <a:off x="838200" y="365126"/>
+            <a:ext cx="10515600" cy="6290116"/>
           </a:xfrm>
-          <a:prstGeom prst="rect">
-            <a:avLst/>
-          </a:prstGeom>
         </p:spPr>
         <p:txBody>
           <a:bodyPr/>
           <a:lstStyle/>
           <a:p>
-            <a:endParaRPr lang="zh-CN" altLang="en-US"/>
-          </a:p>
-        </p:txBody>
-      </p:sp>
-      <p:sp>
-        <p:nvSpPr>
-          <p:cNvPr id="6" name="灯片编号占位符 5">
-            <a:extLst>
-              <a:ext uri="{FF2B5EF4-FFF2-40B4-BE49-F238E27FC236}">
-                <a16:creationId xmlns:a16="http://schemas.microsoft.com/office/drawing/2014/main" id="{2E48D627-B92D-439D-AA2F-9577592463E8}"/>
-              </a:ext>
-            </a:extLst>
-          </p:cNvPr>
-          <p:cNvSpPr>
-            <a:spLocks noGrp="1"/>
-          </p:cNvSpPr>
-          <p:nvPr>
-            <p:ph type="sldNum" sz="quarter" idx="12"/>
-          </p:nvPr>
-        </p:nvSpPr>
-        <p:spPr>
-          <a:xfrm>
-            <a:off x="8610600" y="6356350"/>
-            <a:ext cx="2743200" cy="365125"/>
-          </a:xfrm>
-          <a:prstGeom prst="rect">
-            <a:avLst/>
-          </a:prstGeom>
-        </p:spPr>
-        <p:txBody>
-          <a:bodyPr/>
-          <a:lstStyle/>
-          <a:p>
-            <a:fld id="{0DD8ACD7-CFC9-409D-A750-3690C2E732C8}" type="slidenum">
-              <a:rPr lang="zh-CN" altLang="en-US" smtClean="0"/>
-              <a:t>‹#›</a:t>
-            </a:fld>
-            <a:endParaRPr lang="zh-CN" altLang="en-US"/>
+            <a:pPr lvl="0"/>
+            <a:r>
+              <a:rPr lang="zh-CN" altLang="en-US" dirty="0"/>
+              <a:t>单击此处编辑母版文本样式</a:t>
+            </a:r>
+          </a:p>
+          <a:p>
+            <a:pPr lvl="1"/>
+            <a:r>
+              <a:rPr lang="zh-CN" altLang="en-US" dirty="0"/>
+              <a:t>二级</a:t>
+            </a:r>
+          </a:p>
+          <a:p>
+            <a:pPr lvl="2"/>
+            <a:r>
+              <a:rPr lang="zh-CN" altLang="en-US" dirty="0"/>
+              <a:t>三级</a:t>
+            </a:r>
+          </a:p>
+          <a:p>
+            <a:pPr lvl="3"/>
+            <a:r>
+              <a:rPr lang="zh-CN" altLang="en-US" dirty="0"/>
+              <a:t>四级</a:t>
+            </a:r>
+          </a:p>
+          <a:p>
+            <a:pPr lvl="4"/>
+            <a:r>
+              <a:rPr lang="zh-CN" altLang="en-US" dirty="0"/>
+              <a:t>五级</a:t>
+            </a:r>
           </a:p>
         </p:txBody>
       </p:sp>
     </p:spTree>
     <p:extLst>
       <p:ext uri="{BB962C8B-B14F-4D97-AF65-F5344CB8AC3E}">
-        <p14:creationId xmlns:p14="http://schemas.microsoft.com/office/powerpoint/2010/main" val="2588768634"/>
+        <p14:creationId xmlns:p14="http://schemas.microsoft.com/office/powerpoint/2010/main" val="2663231015"/>
       </p:ext>
     </p:extLst>
   </p:cSld>
@@ -615,6 +721,8 @@
   <p:sldLayoutIdLst>
     <p:sldLayoutId id="2147483649" r:id="rId1"/>
     <p:sldLayoutId id="2147483650" r:id="rId2"/>
+    <p:sldLayoutId id="2147483665" r:id="rId3"/>
+    <p:sldLayoutId id="2147483666" r:id="rId4"/>
   </p:sldLayoutIdLst>
   <p:txStyles>
     <p:titleStyle>
@@ -921,7 +1029,7 @@
           <p:cNvPr id="2" name="标题 1">
             <a:extLst>
               <a:ext uri="{FF2B5EF4-FFF2-40B4-BE49-F238E27FC236}">
-                <a16:creationId xmlns:a16="http://schemas.microsoft.com/office/drawing/2014/main" id="{42CD7FFB-5C2C-46BE-8DDA-4F3B3F53A907}"/>
+                <a16:creationId xmlns:a16="http://schemas.microsoft.com/office/drawing/2014/main" id="{017591C6-EB33-4AF2-A65A-B99EB45F21A6}"/>
               </a:ext>
             </a:extLst>
           </p:cNvPr>
@@ -937,7 +1045,14 @@
           <a:bodyPr/>
           <a:lstStyle/>
           <a:p>
-            <a:endParaRPr lang="zh-CN" altLang="en-US"/>
+            <a:r>
+              <a:rPr lang="en-US" altLang="zh-CN" dirty="0"/>
+              <a:t>Deep Learning </a:t>
+            </a:r>
+            <a:r>
+              <a:rPr lang="zh-CN" altLang="en-US" dirty="0"/>
+              <a:t>调研</a:t>
+            </a:r>
           </a:p>
         </p:txBody>
       </p:sp>
@@ -946,7 +1061,7 @@
           <p:cNvPr id="3" name="副标题 2">
             <a:extLst>
               <a:ext uri="{FF2B5EF4-FFF2-40B4-BE49-F238E27FC236}">
-                <a16:creationId xmlns:a16="http://schemas.microsoft.com/office/drawing/2014/main" id="{85CD13EC-158C-40D7-9793-1004A65CB6A9}"/>
+                <a16:creationId xmlns:a16="http://schemas.microsoft.com/office/drawing/2014/main" id="{503C746C-115C-4866-88EA-CADA1B177F55}"/>
               </a:ext>
             </a:extLst>
           </p:cNvPr>
@@ -969,7 +1084,7 @@
     </p:spTree>
     <p:extLst>
       <p:ext uri="{BB962C8B-B14F-4D97-AF65-F5344CB8AC3E}">
-        <p14:creationId xmlns:p14="http://schemas.microsoft.com/office/powerpoint/2010/main" val="2586698647"/>
+        <p14:creationId xmlns:p14="http://schemas.microsoft.com/office/powerpoint/2010/main" val="4221790287"/>
       </p:ext>
     </p:extLst>
   </p:cSld>
@@ -998,10 +1113,68 @@
       </p:grpSpPr>
       <p:sp>
         <p:nvSpPr>
-          <p:cNvPr id="2" name="标题 1">
-            <a:extLst>
-              <a:ext uri="{FF2B5EF4-FFF2-40B4-BE49-F238E27FC236}">
-                <a16:creationId xmlns:a16="http://schemas.microsoft.com/office/drawing/2014/main" id="{39AD5301-5716-410E-8BFE-8CD8DCC2A75F}"/>
+          <p:cNvPr id="2" name="内容占位符 1">
+            <a:extLst>
+              <a:ext uri="{FF2B5EF4-FFF2-40B4-BE49-F238E27FC236}">
+                <a16:creationId xmlns:a16="http://schemas.microsoft.com/office/drawing/2014/main" id="{6D4EE4BC-A0FC-4612-AE3D-CA0D9FBC2AAD}"/>
+              </a:ext>
+            </a:extLst>
+          </p:cNvPr>
+          <p:cNvSpPr>
+            <a:spLocks noGrp="1"/>
+          </p:cNvSpPr>
+          <p:nvPr>
+            <p:ph idx="1"/>
+          </p:nvPr>
+        </p:nvSpPr>
+        <p:spPr/>
+        <p:txBody>
+          <a:bodyPr/>
+          <a:lstStyle/>
+          <a:p>
+            <a:r>
+              <a:rPr lang="en-US" altLang="zh-CN" sz="2000" dirty="0"/>
+              <a:t>improved from</a:t>
+            </a:r>
+          </a:p>
+          <a:p>
+            <a:endParaRPr lang="en-US" altLang="zh-CN" sz="2000" dirty="0"/>
+          </a:p>
+          <a:p>
+            <a:endParaRPr lang="en-US" altLang="zh-CN" sz="2000" dirty="0"/>
+          </a:p>
+          <a:p>
+            <a:endParaRPr lang="en-US" altLang="zh-CN" sz="2000" dirty="0"/>
+          </a:p>
+          <a:p>
+            <a:endParaRPr lang="en-US" altLang="zh-CN" sz="2000" dirty="0"/>
+          </a:p>
+          <a:p>
+            <a:r>
+              <a:rPr lang="en-US" altLang="zh-CN" sz="2000" dirty="0"/>
+              <a:t> physically implementing adjoint variable method</a:t>
+            </a:r>
+          </a:p>
+          <a:p>
+            <a:r>
+              <a:rPr lang="en-US" altLang="zh-CN" sz="2000" dirty="0"/>
+              <a:t>in situ intensity measurements.</a:t>
+            </a:r>
+          </a:p>
+          <a:p>
+            <a:endParaRPr lang="en-US" altLang="zh-CN" sz="2000" dirty="0"/>
+          </a:p>
+          <a:p>
+            <a:endParaRPr lang="zh-CN" altLang="en-US" dirty="0"/>
+          </a:p>
+        </p:txBody>
+      </p:sp>
+      <p:sp>
+        <p:nvSpPr>
+          <p:cNvPr id="3" name="标题 2">
+            <a:extLst>
+              <a:ext uri="{FF2B5EF4-FFF2-40B4-BE49-F238E27FC236}">
+                <a16:creationId xmlns:a16="http://schemas.microsoft.com/office/drawing/2014/main" id="{5E6EABF3-1128-4569-B8CD-544093170FC3}"/>
               </a:ext>
             </a:extLst>
           </p:cNvPr>
@@ -1017,65 +1190,16 @@
           <a:bodyPr/>
           <a:lstStyle/>
           <a:p>
-            <a:endParaRPr lang="zh-CN" altLang="en-US" dirty="0"/>
-          </a:p>
-        </p:txBody>
-      </p:sp>
-      <p:sp>
-        <p:nvSpPr>
-          <p:cNvPr id="6" name="文本框 5">
-            <a:extLst>
-              <a:ext uri="{FF2B5EF4-FFF2-40B4-BE49-F238E27FC236}">
-                <a16:creationId xmlns:a16="http://schemas.microsoft.com/office/drawing/2014/main" id="{E61EB553-FE4A-4653-B387-3B8040B68DE4}"/>
-              </a:ext>
-            </a:extLst>
-          </p:cNvPr>
-          <p:cNvSpPr txBox="1"/>
-          <p:nvPr/>
-        </p:nvSpPr>
-        <p:spPr>
-          <a:xfrm>
-            <a:off x="7035800" y="879469"/>
-            <a:ext cx="4318000" cy="430887"/>
-          </a:xfrm>
-          <a:prstGeom prst="rect">
-            <a:avLst/>
-          </a:prstGeom>
-          <a:noFill/>
-        </p:spPr>
-        <p:txBody>
-          <a:bodyPr wrap="square" rtlCol="0">
-            <a:spAutoFit/>
-          </a:bodyPr>
-          <a:lstStyle/>
-          <a:p>
-            <a:r>
-              <a:rPr lang="en-US" altLang="zh-CN" sz="1100" dirty="0" err="1">
-                <a:latin typeface="微软雅黑" panose="020B0503020204020204" pitchFamily="34" charset="-122"/>
-                <a:ea typeface="微软雅黑" panose="020B0503020204020204" pitchFamily="34" charset="-122"/>
-              </a:rPr>
-              <a:t>Shanhui</a:t>
-            </a:r>
-            <a:r>
-              <a:rPr lang="en-US" altLang="zh-CN" sz="1100" dirty="0">
-                <a:latin typeface="微软雅黑" panose="020B0503020204020204" pitchFamily="34" charset="-122"/>
-                <a:ea typeface="微软雅黑" panose="020B0503020204020204" pitchFamily="34" charset="-122"/>
-              </a:rPr>
-              <a:t> Fan et al., “In-situ Backpropagation in Photonic Neural Networks”, Frontiers in Optics/ Laser Science, 2018.</a:t>
-            </a:r>
-            <a:endParaRPr lang="zh-CN" altLang="en-US" sz="1100" dirty="0">
-              <a:latin typeface="微软雅黑" panose="020B0503020204020204" pitchFamily="34" charset="-122"/>
-              <a:ea typeface="微软雅黑" panose="020B0503020204020204" pitchFamily="34" charset="-122"/>
-            </a:endParaRPr>
+            <a:endParaRPr lang="zh-CN" altLang="en-US"/>
           </a:p>
         </p:txBody>
       </p:sp>
       <p:pic>
         <p:nvPicPr>
-          <p:cNvPr id="9" name="图片 8">
-            <a:extLst>
-              <a:ext uri="{FF2B5EF4-FFF2-40B4-BE49-F238E27FC236}">
-                <a16:creationId xmlns:a16="http://schemas.microsoft.com/office/drawing/2014/main" id="{93E08780-8377-45CD-8118-A8ECE4CDFF3D}"/>
+          <p:cNvPr id="4" name="图片 3">
+            <a:extLst>
+              <a:ext uri="{FF2B5EF4-FFF2-40B4-BE49-F238E27FC236}">
+                <a16:creationId xmlns:a16="http://schemas.microsoft.com/office/drawing/2014/main" id="{90ABFCAC-8CC1-457F-AD1D-9326A629F033}"/>
               </a:ext>
             </a:extLst>
           </p:cNvPr>
@@ -1092,7 +1216,7 @@
         </p:blipFill>
         <p:spPr>
           <a:xfrm>
-            <a:off x="2099733" y="1510748"/>
+            <a:off x="1761067" y="1662112"/>
             <a:ext cx="2562225" cy="3533775"/>
           </a:xfrm>
           <a:prstGeom prst="rect">
@@ -1102,10 +1226,10 @@
       </p:pic>
       <p:sp>
         <p:nvSpPr>
-          <p:cNvPr id="10" name="文本框 9">
-            <a:extLst>
-              <a:ext uri="{FF2B5EF4-FFF2-40B4-BE49-F238E27FC236}">
-                <a16:creationId xmlns:a16="http://schemas.microsoft.com/office/drawing/2014/main" id="{1DC926EE-DB76-4993-85CC-5C0778C50CC5}"/>
+          <p:cNvPr id="5" name="文本框 4">
+            <a:extLst>
+              <a:ext uri="{FF2B5EF4-FFF2-40B4-BE49-F238E27FC236}">
+                <a16:creationId xmlns:a16="http://schemas.microsoft.com/office/drawing/2014/main" id="{5A189C09-8C4A-49FF-A148-ECCA8597AB09}"/>
               </a:ext>
             </a:extLst>
           </p:cNvPr>
@@ -1114,7 +1238,7 @@
         </p:nvSpPr>
         <p:spPr>
           <a:xfrm>
-            <a:off x="838200" y="5243305"/>
+            <a:off x="237067" y="5323323"/>
             <a:ext cx="6197600" cy="1169551"/>
           </a:xfrm>
           <a:prstGeom prst="rect">
@@ -1138,10 +1262,155 @@
           </a:p>
         </p:txBody>
       </p:sp>
+      <p:sp>
+        <p:nvSpPr>
+          <p:cNvPr id="6" name="文本框 5">
+            <a:extLst>
+              <a:ext uri="{FF2B5EF4-FFF2-40B4-BE49-F238E27FC236}">
+                <a16:creationId xmlns:a16="http://schemas.microsoft.com/office/drawing/2014/main" id="{EB5C02BF-A34A-4783-A402-ACC3E530FEE2}"/>
+              </a:ext>
+            </a:extLst>
+          </p:cNvPr>
+          <p:cNvSpPr txBox="1"/>
+          <p:nvPr/>
+        </p:nvSpPr>
+        <p:spPr>
+          <a:xfrm>
+            <a:off x="7035800" y="879469"/>
+            <a:ext cx="4318000" cy="430887"/>
+          </a:xfrm>
+          <a:prstGeom prst="rect">
+            <a:avLst/>
+          </a:prstGeom>
+          <a:noFill/>
+        </p:spPr>
+        <p:txBody>
+          <a:bodyPr wrap="square" rtlCol="0">
+            <a:spAutoFit/>
+          </a:bodyPr>
+          <a:lstStyle/>
+          <a:p>
+            <a:r>
+              <a:rPr lang="en-US" altLang="zh-CN" sz="1100" dirty="0" err="1">
+                <a:latin typeface="微软雅黑" panose="020B0503020204020204" pitchFamily="34" charset="-122"/>
+                <a:ea typeface="微软雅黑" panose="020B0503020204020204" pitchFamily="34" charset="-122"/>
+              </a:rPr>
+              <a:t>Shanhui</a:t>
+            </a:r>
+            <a:r>
+              <a:rPr lang="en-US" altLang="zh-CN" sz="1100" dirty="0">
+                <a:latin typeface="微软雅黑" panose="020B0503020204020204" pitchFamily="34" charset="-122"/>
+                <a:ea typeface="微软雅黑" panose="020B0503020204020204" pitchFamily="34" charset="-122"/>
+              </a:rPr>
+              <a:t> Fan et al., “In-situ Backpropagation in Photonic Neural Networks”, Frontiers in Optics/ Laser Science, 2018.</a:t>
+            </a:r>
+            <a:endParaRPr lang="zh-CN" altLang="en-US" sz="1100" dirty="0">
+              <a:latin typeface="微软雅黑" panose="020B0503020204020204" pitchFamily="34" charset="-122"/>
+              <a:ea typeface="微软雅黑" panose="020B0503020204020204" pitchFamily="34" charset="-122"/>
+            </a:endParaRPr>
+          </a:p>
+        </p:txBody>
+      </p:sp>
+      <p:pic>
+        <p:nvPicPr>
+          <p:cNvPr id="7" name="图片 6">
+            <a:extLst>
+              <a:ext uri="{FF2B5EF4-FFF2-40B4-BE49-F238E27FC236}">
+                <a16:creationId xmlns:a16="http://schemas.microsoft.com/office/drawing/2014/main" id="{E7CC8516-375F-4E70-BC1E-1C1EDD9B7E6B}"/>
+              </a:ext>
+            </a:extLst>
+          </p:cNvPr>
+          <p:cNvPicPr>
+            <a:picLocks noChangeAspect="1"/>
+          </p:cNvPicPr>
+          <p:nvPr/>
+        </p:nvPicPr>
+        <p:blipFill>
+          <a:blip r:embed="rId3"/>
+          <a:stretch>
+            <a:fillRect/>
+          </a:stretch>
+        </p:blipFill>
+        <p:spPr>
+          <a:xfrm>
+            <a:off x="6166439" y="2017975"/>
+            <a:ext cx="3575989" cy="1411024"/>
+          </a:xfrm>
+          <a:prstGeom prst="rect">
+            <a:avLst/>
+          </a:prstGeom>
+        </p:spPr>
+      </p:pic>
+      <p:sp>
+        <p:nvSpPr>
+          <p:cNvPr id="8" name="矩形 7">
+            <a:extLst>
+              <a:ext uri="{FF2B5EF4-FFF2-40B4-BE49-F238E27FC236}">
+                <a16:creationId xmlns:a16="http://schemas.microsoft.com/office/drawing/2014/main" id="{92C861B7-10BF-4BCA-8C95-106EAC7F877B}"/>
+              </a:ext>
+            </a:extLst>
+          </p:cNvPr>
+          <p:cNvSpPr/>
+          <p:nvPr/>
+        </p:nvSpPr>
+        <p:spPr>
+          <a:xfrm>
+            <a:off x="9812867" y="2446488"/>
+            <a:ext cx="2562225" cy="553998"/>
+          </a:xfrm>
+          <a:prstGeom prst="rect">
+            <a:avLst/>
+          </a:prstGeom>
+        </p:spPr>
+        <p:txBody>
+          <a:bodyPr wrap="square">
+            <a:spAutoFit/>
+          </a:bodyPr>
+          <a:lstStyle/>
+          <a:p>
+            <a:r>
+              <a:rPr lang="en-US" altLang="zh-CN" sz="1000" dirty="0">
+                <a:latin typeface="微软雅黑" panose="020B0503020204020204" pitchFamily="34" charset="-122"/>
+                <a:ea typeface="微软雅黑" panose="020B0503020204020204" pitchFamily="34" charset="-122"/>
+              </a:rPr>
+              <a:t>Shen </a:t>
+            </a:r>
+            <a:r>
+              <a:rPr lang="en-US" altLang="zh-CN" sz="1000" dirty="0" err="1">
+                <a:latin typeface="微软雅黑" panose="020B0503020204020204" pitchFamily="34" charset="-122"/>
+                <a:ea typeface="微软雅黑" panose="020B0503020204020204" pitchFamily="34" charset="-122"/>
+              </a:rPr>
+              <a:t>Yichen</a:t>
+            </a:r>
+            <a:r>
+              <a:rPr lang="en-US" altLang="zh-CN" sz="1000" dirty="0">
+                <a:latin typeface="微软雅黑" panose="020B0503020204020204" pitchFamily="34" charset="-122"/>
+                <a:ea typeface="微软雅黑" panose="020B0503020204020204" pitchFamily="34" charset="-122"/>
+              </a:rPr>
+              <a:t> </a:t>
+            </a:r>
+            <a:r>
+              <a:rPr lang="en-US" altLang="zh-CN" sz="1000" dirty="0" err="1">
+                <a:latin typeface="微软雅黑" panose="020B0503020204020204" pitchFamily="34" charset="-122"/>
+                <a:ea typeface="微软雅黑" panose="020B0503020204020204" pitchFamily="34" charset="-122"/>
+              </a:rPr>
+              <a:t>etal</a:t>
+            </a:r>
+            <a:r>
+              <a:rPr lang="en-US" altLang="zh-CN" sz="1000" dirty="0">
+                <a:latin typeface="微软雅黑" panose="020B0503020204020204" pitchFamily="34" charset="-122"/>
+                <a:ea typeface="微软雅黑" panose="020B0503020204020204" pitchFamily="34" charset="-122"/>
+              </a:rPr>
+              <a:t>., Deep learning with coherent nanophotonic circuits, Nature Photonics, 2017</a:t>
+            </a:r>
+            <a:endParaRPr lang="zh-CN" altLang="en-US" sz="1000" dirty="0"/>
+          </a:p>
+        </p:txBody>
+      </p:sp>
     </p:spTree>
     <p:extLst>
       <p:ext uri="{BB962C8B-B14F-4D97-AF65-F5344CB8AC3E}">
-        <p14:creationId xmlns:p14="http://schemas.microsoft.com/office/powerpoint/2010/main" val="405108522"/>
+        <p14:creationId xmlns:p14="http://schemas.microsoft.com/office/powerpoint/2010/main" val="463904663"/>
       </p:ext>
     </p:extLst>
   </p:cSld>
@@ -1170,10 +1439,55 @@
       </p:grpSpPr>
       <p:sp>
         <p:nvSpPr>
-          <p:cNvPr id="2" name="标题 1">
-            <a:extLst>
-              <a:ext uri="{FF2B5EF4-FFF2-40B4-BE49-F238E27FC236}">
-                <a16:creationId xmlns:a16="http://schemas.microsoft.com/office/drawing/2014/main" id="{D4B2E4EE-460C-4F0E-BF7E-2D662FD469E0}"/>
+          <p:cNvPr id="2" name="内容占位符 1">
+            <a:extLst>
+              <a:ext uri="{FF2B5EF4-FFF2-40B4-BE49-F238E27FC236}">
+                <a16:creationId xmlns:a16="http://schemas.microsoft.com/office/drawing/2014/main" id="{98DFDBBA-1FFE-4CE1-B3FF-0286D47B531C}"/>
+              </a:ext>
+            </a:extLst>
+          </p:cNvPr>
+          <p:cNvSpPr>
+            <a:spLocks noGrp="1"/>
+          </p:cNvSpPr>
+          <p:nvPr>
+            <p:ph idx="1"/>
+          </p:nvPr>
+        </p:nvSpPr>
+        <p:spPr/>
+        <p:txBody>
+          <a:bodyPr/>
+          <a:lstStyle/>
+          <a:p>
+            <a:r>
+              <a:rPr lang="zh-CN" altLang="en-US" dirty="0"/>
+              <a:t>对原文献的评价：</a:t>
+            </a:r>
+            <a:r>
+              <a:rPr lang="en-US" altLang="zh-CN" dirty="0"/>
+              <a:t>the training of the phase-shifter settings for this system was performed using a model implemented on a standard computer, which does not take into account experimental errors, and furthermore loses all the potential advantages in time and energy of the photonic implementation.</a:t>
+            </a:r>
+          </a:p>
+          <a:p>
+            <a:r>
+              <a:rPr lang="zh-CN" altLang="en-US" dirty="0"/>
+              <a:t>改进：</a:t>
+            </a:r>
+            <a:r>
+              <a:rPr lang="en-US" altLang="zh-CN" dirty="0"/>
+              <a:t>The only additional component that is required is a means to measure the light intensity in the vicinity of each of the tunable phase shifters.</a:t>
+            </a:r>
+          </a:p>
+          <a:p>
+            <a:endParaRPr lang="zh-CN" altLang="en-US" dirty="0"/>
+          </a:p>
+        </p:txBody>
+      </p:sp>
+      <p:sp>
+        <p:nvSpPr>
+          <p:cNvPr id="3" name="标题 2">
+            <a:extLst>
+              <a:ext uri="{FF2B5EF4-FFF2-40B4-BE49-F238E27FC236}">
+                <a16:creationId xmlns:a16="http://schemas.microsoft.com/office/drawing/2014/main" id="{9AECF509-9876-4857-AB32-F4D89C22ABF6}"/>
               </a:ext>
             </a:extLst>
           </p:cNvPr>
@@ -1189,39 +1503,17 @@
           <a:bodyPr/>
           <a:lstStyle/>
           <a:p>
-            <a:endParaRPr lang="zh-CN" altLang="en-US"/>
-          </a:p>
-        </p:txBody>
-      </p:sp>
-      <p:sp>
-        <p:nvSpPr>
-          <p:cNvPr id="3" name="内容占位符 2">
-            <a:extLst>
-              <a:ext uri="{FF2B5EF4-FFF2-40B4-BE49-F238E27FC236}">
-                <a16:creationId xmlns:a16="http://schemas.microsoft.com/office/drawing/2014/main" id="{1DBC5692-C908-4387-B9D3-C934BE4DDDA2}"/>
-              </a:ext>
-            </a:extLst>
-          </p:cNvPr>
-          <p:cNvSpPr>
-            <a:spLocks noGrp="1"/>
-          </p:cNvSpPr>
-          <p:nvPr>
-            <p:ph idx="1"/>
-          </p:nvPr>
-        </p:nvSpPr>
-        <p:spPr/>
-        <p:txBody>
-          <a:bodyPr/>
-          <a:lstStyle/>
-          <a:p>
-            <a:endParaRPr lang="zh-CN" altLang="en-US"/>
+            <a:r>
+              <a:rPr lang="zh-CN" altLang="en-US" dirty="0"/>
+              <a:t>改进</a:t>
+            </a:r>
           </a:p>
         </p:txBody>
       </p:sp>
     </p:spTree>
     <p:extLst>
       <p:ext uri="{BB962C8B-B14F-4D97-AF65-F5344CB8AC3E}">
-        <p14:creationId xmlns:p14="http://schemas.microsoft.com/office/powerpoint/2010/main" val="629986059"/>
+        <p14:creationId xmlns:p14="http://schemas.microsoft.com/office/powerpoint/2010/main" val="1487854094"/>
       </p:ext>
     </p:extLst>
   </p:cSld>
@@ -1250,10 +1542,55 @@
       </p:grpSpPr>
       <p:sp>
         <p:nvSpPr>
-          <p:cNvPr id="2" name="标题 1">
-            <a:extLst>
-              <a:ext uri="{FF2B5EF4-FFF2-40B4-BE49-F238E27FC236}">
-                <a16:creationId xmlns:a16="http://schemas.microsoft.com/office/drawing/2014/main" id="{4AB7B515-D5C4-4848-9848-6C24463E1788}"/>
+          <p:cNvPr id="2" name="内容占位符 1">
+            <a:extLst>
+              <a:ext uri="{FF2B5EF4-FFF2-40B4-BE49-F238E27FC236}">
+                <a16:creationId xmlns:a16="http://schemas.microsoft.com/office/drawing/2014/main" id="{96401D0D-6B6C-434D-AF85-25855792BCD5}"/>
+              </a:ext>
+            </a:extLst>
+          </p:cNvPr>
+          <p:cNvSpPr>
+            <a:spLocks noGrp="1"/>
+          </p:cNvSpPr>
+          <p:nvPr>
+            <p:ph idx="1"/>
+          </p:nvPr>
+        </p:nvSpPr>
+        <p:spPr/>
+        <p:txBody>
+          <a:bodyPr/>
+          <a:lstStyle/>
+          <a:p>
+            <a:r>
+              <a:rPr lang="en-US" altLang="zh-CN" dirty="0"/>
+              <a:t>This procedure for the gradient computation is exact if we assume a lossless, reciprocal, feed-forward propagation inside the </a:t>
+            </a:r>
+            <a:r>
+              <a:rPr lang="en-US" altLang="zh-CN" dirty="0" err="1"/>
+              <a:t>OIU</a:t>
+            </a:r>
+            <a:r>
+              <a:rPr lang="en-US" altLang="zh-CN" dirty="0"/>
+              <a:t>, which is to a good approximation true.</a:t>
+            </a:r>
+          </a:p>
+          <a:p>
+            <a:r>
+              <a:rPr lang="en-US" altLang="zh-CN" dirty="0"/>
+              <a:t>40% of the light is lost due to back-scattering and radiation losses</a:t>
+            </a:r>
+          </a:p>
+          <a:p>
+            <a:endParaRPr lang="zh-CN" altLang="en-US" dirty="0"/>
+          </a:p>
+        </p:txBody>
+      </p:sp>
+      <p:sp>
+        <p:nvSpPr>
+          <p:cNvPr id="3" name="标题 2">
+            <a:extLst>
+              <a:ext uri="{FF2B5EF4-FFF2-40B4-BE49-F238E27FC236}">
+                <a16:creationId xmlns:a16="http://schemas.microsoft.com/office/drawing/2014/main" id="{52D259F2-04A8-432A-83CE-0BA61CBFA6BB}"/>
               </a:ext>
             </a:extLst>
           </p:cNvPr>
@@ -1269,16 +1606,129 @@
           <a:bodyPr/>
           <a:lstStyle/>
           <a:p>
-            <a:endParaRPr lang="zh-CN" altLang="en-US"/>
-          </a:p>
-        </p:txBody>
-      </p:sp>
-      <p:sp>
-        <p:nvSpPr>
-          <p:cNvPr id="3" name="内容占位符 2">
-            <a:extLst>
-              <a:ext uri="{FF2B5EF4-FFF2-40B4-BE49-F238E27FC236}">
-                <a16:creationId xmlns:a16="http://schemas.microsoft.com/office/drawing/2014/main" id="{715B7B6C-51D2-45E6-B75A-29D586E12838}"/>
+            <a:r>
+              <a:rPr lang="en-US" altLang="zh-CN" dirty="0"/>
+              <a:t>Restriction</a:t>
+            </a:r>
+            <a:endParaRPr lang="zh-CN" altLang="en-US" dirty="0"/>
+          </a:p>
+        </p:txBody>
+      </p:sp>
+      <p:pic>
+        <p:nvPicPr>
+          <p:cNvPr id="4" name="图片 3">
+            <a:extLst>
+              <a:ext uri="{FF2B5EF4-FFF2-40B4-BE49-F238E27FC236}">
+                <a16:creationId xmlns:a16="http://schemas.microsoft.com/office/drawing/2014/main" id="{EBDD6999-C94B-47FB-BD2E-077EFAE18A57}"/>
+              </a:ext>
+            </a:extLst>
+          </p:cNvPr>
+          <p:cNvPicPr>
+            <a:picLocks noChangeAspect="1"/>
+          </p:cNvPicPr>
+          <p:nvPr/>
+        </p:nvPicPr>
+        <p:blipFill>
+          <a:blip r:embed="rId2"/>
+          <a:stretch>
+            <a:fillRect/>
+          </a:stretch>
+        </p:blipFill>
+        <p:spPr>
+          <a:xfrm>
+            <a:off x="1129241" y="3687073"/>
+            <a:ext cx="8172450" cy="2752725"/>
+          </a:xfrm>
+          <a:prstGeom prst="rect">
+            <a:avLst/>
+          </a:prstGeom>
+        </p:spPr>
+      </p:pic>
+      <p:sp>
+        <p:nvSpPr>
+          <p:cNvPr id="5" name="文本框 4">
+            <a:extLst>
+              <a:ext uri="{FF2B5EF4-FFF2-40B4-BE49-F238E27FC236}">
+                <a16:creationId xmlns:a16="http://schemas.microsoft.com/office/drawing/2014/main" id="{BAA5B594-66B7-4138-8CDA-336031BB1325}"/>
+              </a:ext>
+            </a:extLst>
+          </p:cNvPr>
+          <p:cNvSpPr txBox="1"/>
+          <p:nvPr/>
+        </p:nvSpPr>
+        <p:spPr>
+          <a:xfrm>
+            <a:off x="9301691" y="5393359"/>
+            <a:ext cx="2523067" cy="707886"/>
+          </a:xfrm>
+          <a:prstGeom prst="rect">
+            <a:avLst/>
+          </a:prstGeom>
+          <a:noFill/>
+        </p:spPr>
+        <p:txBody>
+          <a:bodyPr wrap="square" rtlCol="0">
+            <a:spAutoFit/>
+          </a:bodyPr>
+          <a:lstStyle/>
+          <a:p>
+            <a:r>
+              <a:rPr lang="en-US" altLang="zh-CN" sz="1000" dirty="0" err="1">
+                <a:latin typeface="微软雅黑" panose="020B0503020204020204" pitchFamily="34" charset="-122"/>
+                <a:ea typeface="微软雅黑" panose="020B0503020204020204" pitchFamily="34" charset="-122"/>
+              </a:rPr>
+              <a:t>Shanhui</a:t>
+            </a:r>
+            <a:r>
+              <a:rPr lang="en-US" altLang="zh-CN" sz="1000" dirty="0">
+                <a:latin typeface="微软雅黑" panose="020B0503020204020204" pitchFamily="34" charset="-122"/>
+                <a:ea typeface="微软雅黑" panose="020B0503020204020204" pitchFamily="34" charset="-122"/>
+              </a:rPr>
+              <a:t> Fan et al., “In-situ Backpropagation in Photonic Neural Networks”, Frontiers in Optics/ Laser Science, 2018.</a:t>
+            </a:r>
+            <a:endParaRPr lang="zh-CN" altLang="en-US" sz="1000" dirty="0">
+              <a:latin typeface="微软雅黑" panose="020B0503020204020204" pitchFamily="34" charset="-122"/>
+              <a:ea typeface="微软雅黑" panose="020B0503020204020204" pitchFamily="34" charset="-122"/>
+            </a:endParaRPr>
+          </a:p>
+        </p:txBody>
+      </p:sp>
+    </p:spTree>
+    <p:extLst>
+      <p:ext uri="{BB962C8B-B14F-4D97-AF65-F5344CB8AC3E}">
+        <p14:creationId xmlns:p14="http://schemas.microsoft.com/office/powerpoint/2010/main" val="1854545203"/>
+      </p:ext>
+    </p:extLst>
+  </p:cSld>
+  <p:clrMapOvr>
+    <a:masterClrMapping/>
+  </p:clrMapOvr>
+</p:sld>
+</file>
+
+<file path=ppt/slides/slide5.xml><?xml version="1.0" encoding="utf-8"?>
+<p:sld xmlns:a="http://schemas.openxmlformats.org/drawingml/2006/main" xmlns:r="http://schemas.openxmlformats.org/officeDocument/2006/relationships" xmlns:p="http://schemas.openxmlformats.org/presentationml/2006/main">
+  <p:cSld>
+    <p:spTree>
+      <p:nvGrpSpPr>
+        <p:cNvPr id="1" name=""/>
+        <p:cNvGrpSpPr/>
+        <p:nvPr/>
+      </p:nvGrpSpPr>
+      <p:grpSpPr>
+        <a:xfrm>
+          <a:off x="0" y="0"/>
+          <a:ext cx="0" cy="0"/>
+          <a:chOff x="0" y="0"/>
+          <a:chExt cx="0" cy="0"/>
+        </a:xfrm>
+      </p:grpSpPr>
+      <p:sp>
+        <p:nvSpPr>
+          <p:cNvPr id="2" name="内容占位符 1">
+            <a:extLst>
+              <a:ext uri="{FF2B5EF4-FFF2-40B4-BE49-F238E27FC236}">
+                <a16:creationId xmlns:a16="http://schemas.microsoft.com/office/drawing/2014/main" id="{33FFD9F5-87AD-4FE8-B4D3-A0232C7CA129}"/>
               </a:ext>
             </a:extLst>
           </p:cNvPr>
@@ -1294,14 +1744,172 @@
           <a:bodyPr/>
           <a:lstStyle/>
           <a:p>
-            <a:endParaRPr lang="zh-CN" altLang="en-US"/>
+            <a:endParaRPr lang="zh-CN" altLang="en-US" dirty="0"/>
+          </a:p>
+        </p:txBody>
+      </p:sp>
+      <p:sp>
+        <p:nvSpPr>
+          <p:cNvPr id="3" name="标题 2">
+            <a:extLst>
+              <a:ext uri="{FF2B5EF4-FFF2-40B4-BE49-F238E27FC236}">
+                <a16:creationId xmlns:a16="http://schemas.microsoft.com/office/drawing/2014/main" id="{39A2AFA2-FBD0-4182-99FE-0864CC4BA2FC}"/>
+              </a:ext>
+            </a:extLst>
+          </p:cNvPr>
+          <p:cNvSpPr>
+            <a:spLocks noGrp="1"/>
+          </p:cNvSpPr>
+          <p:nvPr>
+            <p:ph type="title"/>
+          </p:nvPr>
+        </p:nvSpPr>
+        <p:spPr/>
+        <p:txBody>
+          <a:bodyPr/>
+          <a:lstStyle/>
+          <a:p>
+            <a:r>
+              <a:rPr lang="en-US" altLang="zh-CN" dirty="0"/>
+              <a:t>Results</a:t>
+            </a:r>
+            <a:endParaRPr lang="zh-CN" altLang="en-US" dirty="0"/>
+          </a:p>
+        </p:txBody>
+      </p:sp>
+      <p:pic>
+        <p:nvPicPr>
+          <p:cNvPr id="5" name="图片 4">
+            <a:extLst>
+              <a:ext uri="{FF2B5EF4-FFF2-40B4-BE49-F238E27FC236}">
+                <a16:creationId xmlns:a16="http://schemas.microsoft.com/office/drawing/2014/main" id="{582F743E-CCA2-486A-9B01-0D237583C815}"/>
+              </a:ext>
+            </a:extLst>
+          </p:cNvPr>
+          <p:cNvPicPr>
+            <a:picLocks noChangeAspect="1"/>
+          </p:cNvPicPr>
+          <p:nvPr/>
+        </p:nvPicPr>
+        <p:blipFill>
+          <a:blip r:embed="rId2"/>
+          <a:stretch>
+            <a:fillRect/>
+          </a:stretch>
+        </p:blipFill>
+        <p:spPr>
+          <a:xfrm>
+            <a:off x="838200" y="1510748"/>
+            <a:ext cx="8248650" cy="3810000"/>
+          </a:xfrm>
+          <a:prstGeom prst="rect">
+            <a:avLst/>
+          </a:prstGeom>
+        </p:spPr>
+      </p:pic>
+      <p:sp>
+        <p:nvSpPr>
+          <p:cNvPr id="6" name="文本框 5">
+            <a:extLst>
+              <a:ext uri="{FF2B5EF4-FFF2-40B4-BE49-F238E27FC236}">
+                <a16:creationId xmlns:a16="http://schemas.microsoft.com/office/drawing/2014/main" id="{9D98CEB8-4011-4103-BE04-D2C10A5365C5}"/>
+              </a:ext>
+            </a:extLst>
+          </p:cNvPr>
+          <p:cNvSpPr txBox="1"/>
+          <p:nvPr/>
+        </p:nvSpPr>
+        <p:spPr>
+          <a:xfrm>
+            <a:off x="9454369" y="3581400"/>
+            <a:ext cx="1899431" cy="369332"/>
+          </a:xfrm>
+          <a:prstGeom prst="rect">
+            <a:avLst/>
+          </a:prstGeom>
+          <a:noFill/>
+        </p:spPr>
+        <p:txBody>
+          <a:bodyPr wrap="none" rtlCol="0">
+            <a:spAutoFit/>
+          </a:bodyPr>
+          <a:lstStyle/>
+          <a:p>
+            <a:pPr algn="l">
+              <a:lnSpc>
+                <a:spcPct val="90000"/>
+              </a:lnSpc>
+              <a:spcBef>
+                <a:spcPts val="1000"/>
+              </a:spcBef>
+            </a:pPr>
+            <a:r>
+              <a:rPr lang="en-US" altLang="zh-CN" sz="2000" dirty="0">
+                <a:latin typeface="微软雅黑" panose="020B0503020204020204" pitchFamily="34" charset="-122"/>
+                <a:ea typeface="微软雅黑" panose="020B0503020204020204" pitchFamily="34" charset="-122"/>
+              </a:rPr>
+              <a:t>91% precision</a:t>
+            </a:r>
+            <a:endParaRPr lang="zh-CN" altLang="en-US" sz="2000" dirty="0">
+              <a:latin typeface="微软雅黑" panose="020B0503020204020204" pitchFamily="34" charset="-122"/>
+              <a:ea typeface="微软雅黑" panose="020B0503020204020204" pitchFamily="34" charset="-122"/>
+            </a:endParaRPr>
+          </a:p>
+        </p:txBody>
+      </p:sp>
+      <p:sp>
+        <p:nvSpPr>
+          <p:cNvPr id="8" name="文本框 7">
+            <a:extLst>
+              <a:ext uri="{FF2B5EF4-FFF2-40B4-BE49-F238E27FC236}">
+                <a16:creationId xmlns:a16="http://schemas.microsoft.com/office/drawing/2014/main" id="{BA0FEC60-91DD-4EF3-AC1F-4F13FB9FCFC5}"/>
+              </a:ext>
+            </a:extLst>
+          </p:cNvPr>
+          <p:cNvSpPr txBox="1"/>
+          <p:nvPr/>
+        </p:nvSpPr>
+        <p:spPr>
+          <a:xfrm>
+            <a:off x="3268133" y="5519530"/>
+            <a:ext cx="4416425" cy="400110"/>
+          </a:xfrm>
+          <a:prstGeom prst="rect">
+            <a:avLst/>
+          </a:prstGeom>
+          <a:noFill/>
+        </p:spPr>
+        <p:txBody>
+          <a:bodyPr wrap="square" rtlCol="0">
+            <a:spAutoFit/>
+          </a:bodyPr>
+          <a:lstStyle/>
+          <a:p>
+            <a:r>
+              <a:rPr lang="en-US" altLang="zh-CN" sz="1000" dirty="0" err="1">
+                <a:latin typeface="微软雅黑" panose="020B0503020204020204" pitchFamily="34" charset="-122"/>
+                <a:ea typeface="微软雅黑" panose="020B0503020204020204" pitchFamily="34" charset="-122"/>
+              </a:rPr>
+              <a:t>Shanhui</a:t>
+            </a:r>
+            <a:r>
+              <a:rPr lang="en-US" altLang="zh-CN" sz="1000" dirty="0">
+                <a:latin typeface="微软雅黑" panose="020B0503020204020204" pitchFamily="34" charset="-122"/>
+                <a:ea typeface="微软雅黑" panose="020B0503020204020204" pitchFamily="34" charset="-122"/>
+              </a:rPr>
+              <a:t> Fan et al., “In-situ Backpropagation in Photonic Neural Networks”, Frontiers in Optics/ Laser Science, 2018.</a:t>
+            </a:r>
+            <a:endParaRPr lang="zh-CN" altLang="en-US" sz="1000" dirty="0">
+              <a:latin typeface="微软雅黑" panose="020B0503020204020204" pitchFamily="34" charset="-122"/>
+              <a:ea typeface="微软雅黑" panose="020B0503020204020204" pitchFamily="34" charset="-122"/>
+            </a:endParaRPr>
           </a:p>
         </p:txBody>
       </p:sp>
     </p:spTree>
     <p:extLst>
       <p:ext uri="{BB962C8B-B14F-4D97-AF65-F5344CB8AC3E}">
-        <p14:creationId xmlns:p14="http://schemas.microsoft.com/office/powerpoint/2010/main" val="1498999888"/>
+        <p14:creationId xmlns:p14="http://schemas.microsoft.com/office/powerpoint/2010/main" val="3607707527"/>
       </p:ext>
     </p:extLst>
   </p:cSld>
@@ -1606,7 +2214,13 @@
       </a:bodyPr>
       <a:lstStyle>
         <a:defPPr algn="l">
-          <a:defRPr dirty="0" smtClean="0">
+          <a:lnSpc>
+            <a:spcPct val="90000"/>
+          </a:lnSpc>
+          <a:spcBef>
+            <a:spcPts val="1000"/>
+          </a:spcBef>
+          <a:defRPr sz="2800" dirty="0" smtClean="0">
             <a:latin typeface="微软雅黑" panose="020B0503020204020204" pitchFamily="34" charset="-122"/>
             <a:ea typeface="微软雅黑" panose="020B0503020204020204" pitchFamily="34" charset="-122"/>
           </a:defRPr>

</xml_diff>